<commit_message>
Added Technicall presentation for usefull transfer across computers
</commit_message>
<xml_diff>
--- a/OGPC5 Game/Project Resources/Presentation/Urban Towers-General.pptx
+++ b/OGPC5 Game/Project Resources/Presentation/Urban Towers-General.pptx
@@ -14628,7 +14628,7 @@
         <p:spPr/>
         <p:txBody>
           <a:bodyPr>
-            <a:normAutofit lnSpcReduction="10000"/>
+            <a:normAutofit fontScale="92500" lnSpcReduction="20000"/>
           </a:bodyPr>
           <a:lstStyle/>
           <a:p>
@@ -14702,6 +14702,13 @@
               <a:rPr lang="en-US" dirty="0" smtClean="0"/>
               <a:t>Multiple Platforms(Windows, Linux, OSX)</a:t>
             </a:r>
+          </a:p>
+          <a:p>
+            <a:r>
+              <a:rPr lang="en-US" smtClean="0"/>
+              <a:t>GNU GPL v3</a:t>
+            </a:r>
+            <a:endParaRPr lang="en-US" dirty="0" smtClean="0"/>
           </a:p>
           <a:p>
             <a:endParaRPr lang="en-US" dirty="0"/>

</xml_diff>

<commit_message>
Added Gamel presentation for usefull transfer across computers
</commit_message>
<xml_diff>
--- a/OGPC5 Game/Project Resources/Presentation/Urban Towers-General.pptx
+++ b/OGPC5 Game/Project Resources/Presentation/Urban Towers-General.pptx
@@ -14171,7 +14171,19 @@
             <a:pPr lvl="1"/>
             <a:r>
               <a:rPr lang="en-US" dirty="0" smtClean="0"/>
-              <a:t>Certain towers have different affects where they are</a:t>
+              <a:t>Certain towers have </a:t>
+            </a:r>
+            <a:r>
+              <a:rPr lang="en-US" smtClean="0"/>
+              <a:t>different </a:t>
+            </a:r>
+            <a:r>
+              <a:rPr lang="en-US" smtClean="0"/>
+              <a:t>effects </a:t>
+            </a:r>
+            <a:r>
+              <a:rPr lang="en-US" dirty="0" smtClean="0"/>
+              <a:t>where they are</a:t>
             </a:r>
           </a:p>
           <a:p>

</xml_diff>